<commit_message>
Collision logic, RollDice console logic & Piece offsets
Fixed collision logic and LetPlayerRollDice logic.
Added Offset and BoardPosition properties to Piece-types.
</commit_message>
<xml_diff>
--- a/Documentation/Presentation - Koden.pptx
+++ b/Documentation/Presentation - Koden.pptx
@@ -5,7 +5,7 @@
     <p:sldMasterId id="2147483648" r:id="rId1"/>
   </p:sldMasterIdLst>
   <p:notesMasterIdLst>
-    <p:notesMasterId r:id="rId9"/>
+    <p:notesMasterId r:id="rId11"/>
   </p:notesMasterIdLst>
   <p:sldIdLst>
     <p:sldId id="256" r:id="rId2"/>
@@ -15,6 +15,8 @@
     <p:sldId id="260" r:id="rId6"/>
     <p:sldId id="261" r:id="rId7"/>
     <p:sldId id="262" r:id="rId8"/>
+    <p:sldId id="263" r:id="rId9"/>
+    <p:sldId id="264" r:id="rId10"/>
   </p:sldIdLst>
   <p:sldSz cx="12192000" cy="6858000"/>
   <p:notesSz cx="6858000" cy="9144000"/>
@@ -550,106 +552,106 @@
           </a:p>
           <a:p>
             <a:r>
+              <a:rPr lang="en-SE" dirty="0"/>
+              <a:t>I mitten </a:t>
+            </a:r>
+            <a:r>
+              <a:rPr lang="en-SE" dirty="0" err="1"/>
+              <a:t>på</a:t>
+            </a:r>
+            <a:r>
+              <a:rPr lang="en-SE" dirty="0"/>
+              <a:t> </a:t>
+            </a:r>
+            <a:r>
+              <a:rPr lang="en-SE" dirty="0" err="1"/>
+              <a:t>bilden</a:t>
+            </a:r>
+            <a:r>
+              <a:rPr lang="en-SE" dirty="0"/>
+              <a:t> </a:t>
+            </a:r>
+            <a:r>
+              <a:rPr lang="en-SE" dirty="0" err="1"/>
+              <a:t>är</a:t>
+            </a:r>
+            <a:r>
+              <a:rPr lang="en-SE" dirty="0"/>
+              <a:t> </a:t>
+            </a:r>
+            <a:r>
+              <a:rPr lang="en-SE" dirty="0" err="1"/>
+              <a:t>klassbiblioteket</a:t>
+            </a:r>
+            <a:r>
+              <a:rPr lang="en-SE" dirty="0"/>
+              <a:t>, med </a:t>
+            </a:r>
+            <a:r>
+              <a:rPr lang="en-SE" dirty="0" err="1"/>
+              <a:t>spelmotorn</a:t>
+            </a:r>
+            <a:r>
+              <a:rPr lang="en-SE" dirty="0"/>
+              <a:t> </a:t>
+            </a:r>
+            <a:r>
+              <a:rPr lang="en-SE" dirty="0" err="1"/>
+              <a:t>och</a:t>
+            </a:r>
+            <a:r>
+              <a:rPr lang="en-SE" dirty="0"/>
+              <a:t> </a:t>
+            </a:r>
+            <a:r>
+              <a:rPr lang="en-SE" dirty="0" err="1"/>
+              <a:t>logik</a:t>
+            </a:r>
+            <a:r>
+              <a:rPr lang="en-SE" dirty="0"/>
+              <a:t> </a:t>
+            </a:r>
+            <a:r>
+              <a:rPr lang="en-SE" dirty="0" err="1"/>
+              <a:t>för</a:t>
+            </a:r>
+            <a:r>
+              <a:rPr lang="en-SE" dirty="0"/>
+              <a:t> </a:t>
+            </a:r>
+            <a:r>
+              <a:rPr lang="en-SE" dirty="0" err="1"/>
+              <a:t>att</a:t>
+            </a:r>
+            <a:r>
+              <a:rPr lang="en-SE" dirty="0"/>
+              <a:t> </a:t>
+            </a:r>
+            <a:r>
+              <a:rPr lang="en-SE" dirty="0" err="1"/>
+              <a:t>kommunicera</a:t>
+            </a:r>
+            <a:r>
+              <a:rPr lang="en-SE" dirty="0"/>
+              <a:t> med </a:t>
+            </a:r>
+            <a:r>
+              <a:rPr lang="en-SE" dirty="0" err="1"/>
+              <a:t>databasen</a:t>
+            </a:r>
+            <a:r>
+              <a:rPr lang="en-SE" dirty="0"/>
+              <a:t>.</a:t>
+            </a:r>
+          </a:p>
+          <a:p>
+            <a:r>
               <a:rPr lang="en-SE" dirty="0" err="1"/>
               <a:t>Överst</a:t>
             </a:r>
             <a:r>
               <a:rPr lang="en-SE" dirty="0"/>
               <a:t> </a:t>
-            </a:r>
-            <a:r>
-              <a:rPr lang="en-SE" dirty="0" err="1"/>
-              <a:t>på</a:t>
-            </a:r>
-            <a:r>
-              <a:rPr lang="en-SE" dirty="0"/>
-              <a:t> </a:t>
-            </a:r>
-            <a:r>
-              <a:rPr lang="en-SE" dirty="0" err="1"/>
-              <a:t>bilden</a:t>
-            </a:r>
-            <a:r>
-              <a:rPr lang="en-SE" dirty="0"/>
-              <a:t> </a:t>
-            </a:r>
-            <a:r>
-              <a:rPr lang="en-SE" dirty="0" err="1"/>
-              <a:t>är</a:t>
-            </a:r>
-            <a:r>
-              <a:rPr lang="en-SE" dirty="0"/>
-              <a:t> </a:t>
-            </a:r>
-            <a:r>
-              <a:rPr lang="en-SE" dirty="0" err="1"/>
-              <a:t>klassbiblioteket</a:t>
-            </a:r>
-            <a:r>
-              <a:rPr lang="en-SE" dirty="0"/>
-              <a:t>, med </a:t>
-            </a:r>
-            <a:r>
-              <a:rPr lang="en-SE" dirty="0" err="1"/>
-              <a:t>spelmotorn</a:t>
-            </a:r>
-            <a:r>
-              <a:rPr lang="en-SE" dirty="0"/>
-              <a:t> </a:t>
-            </a:r>
-            <a:r>
-              <a:rPr lang="en-SE" dirty="0" err="1"/>
-              <a:t>och</a:t>
-            </a:r>
-            <a:r>
-              <a:rPr lang="en-SE" dirty="0"/>
-              <a:t> </a:t>
-            </a:r>
-            <a:r>
-              <a:rPr lang="en-SE" dirty="0" err="1"/>
-              <a:t>logik</a:t>
-            </a:r>
-            <a:r>
-              <a:rPr lang="en-SE" dirty="0"/>
-              <a:t> </a:t>
-            </a:r>
-            <a:r>
-              <a:rPr lang="en-SE" dirty="0" err="1"/>
-              <a:t>för</a:t>
-            </a:r>
-            <a:r>
-              <a:rPr lang="en-SE" dirty="0"/>
-              <a:t> </a:t>
-            </a:r>
-            <a:r>
-              <a:rPr lang="en-SE" dirty="0" err="1"/>
-              <a:t>att</a:t>
-            </a:r>
-            <a:r>
-              <a:rPr lang="en-SE" dirty="0"/>
-              <a:t> </a:t>
-            </a:r>
-            <a:r>
-              <a:rPr lang="en-SE" dirty="0" err="1"/>
-              <a:t>kommunicera</a:t>
-            </a:r>
-            <a:r>
-              <a:rPr lang="en-SE" dirty="0"/>
-              <a:t> med </a:t>
-            </a:r>
-            <a:r>
-              <a:rPr lang="en-SE" dirty="0" err="1"/>
-              <a:t>databasen</a:t>
-            </a:r>
-            <a:r>
-              <a:rPr lang="en-SE" dirty="0"/>
-              <a:t>.</a:t>
-            </a:r>
-          </a:p>
-          <a:p>
-            <a:r>
-              <a:rPr lang="en-SE" dirty="0"/>
-              <a:t>I mitten </a:t>
             </a:r>
             <a:r>
               <a:rPr lang="en-SE" dirty="0" err="1"/>
@@ -6869,10 +6871,10 @@
       </p:sp>
       <p:pic>
         <p:nvPicPr>
-          <p:cNvPr id="5" name="Content Placeholder 4">
-            <a:extLst>
-              <a:ext uri="{FF2B5EF4-FFF2-40B4-BE49-F238E27FC236}">
-                <a16:creationId xmlns:a16="http://schemas.microsoft.com/office/drawing/2014/main" id="{21EB52B7-FFDA-42A1-B091-90085B8A362B}"/>
+          <p:cNvPr id="13" name="Content Placeholder 12">
+            <a:extLst>
+              <a:ext uri="{FF2B5EF4-FFF2-40B4-BE49-F238E27FC236}">
+                <a16:creationId xmlns:a16="http://schemas.microsoft.com/office/drawing/2014/main" id="{5277F302-3696-410D-AFBC-03507A742B46}"/>
               </a:ext>
             </a:extLst>
           </p:cNvPr>
@@ -6891,8 +6893,8 @@
         </p:blipFill>
         <p:spPr>
           <a:xfrm>
-            <a:off x="3050100" y="2351619"/>
-            <a:ext cx="6091800" cy="3463965"/>
+            <a:off x="3047784" y="1690688"/>
+            <a:ext cx="6096431" cy="4238793"/>
           </a:xfrm>
         </p:spPr>
       </p:pic>
@@ -6947,19 +6949,21 @@
           <a:bodyPr/>
           <a:lstStyle/>
           <a:p>
-            <a:r>
-              <a:rPr lang="en-SE"/>
+            <a:pPr algn="ctr"/>
+            <a:r>
+              <a:rPr lang="en-SE" dirty="0" err="1"/>
               <a:t>Spelmotorn</a:t>
             </a:r>
+            <a:endParaRPr lang="en-SE" dirty="0"/>
           </a:p>
         </p:txBody>
       </p:sp>
       <p:pic>
         <p:nvPicPr>
-          <p:cNvPr id="5" name="Content Placeholder 4">
-            <a:extLst>
-              <a:ext uri="{FF2B5EF4-FFF2-40B4-BE49-F238E27FC236}">
-                <a16:creationId xmlns:a16="http://schemas.microsoft.com/office/drawing/2014/main" id="{532A5C94-C23A-4759-884A-28B5B67146F4}"/>
+          <p:cNvPr id="9" name="Content Placeholder 8">
+            <a:extLst>
+              <a:ext uri="{FF2B5EF4-FFF2-40B4-BE49-F238E27FC236}">
+                <a16:creationId xmlns:a16="http://schemas.microsoft.com/office/drawing/2014/main" id="{81DE8B4F-362F-47A9-BD9F-9292D9D0944C}"/>
               </a:ext>
             </a:extLst>
           </p:cNvPr>
@@ -6978,8 +6982,8 @@
         </p:blipFill>
         <p:spPr>
           <a:xfrm>
-            <a:off x="3702154" y="1799588"/>
-            <a:ext cx="4787692" cy="4693287"/>
+            <a:off x="3494331" y="1690688"/>
+            <a:ext cx="5203337" cy="4888437"/>
           </a:xfrm>
         </p:spPr>
       </p:pic>
@@ -6987,6 +6991,1254 @@
     <p:extLst>
       <p:ext uri="{BB962C8B-B14F-4D97-AF65-F5344CB8AC3E}">
         <p14:creationId xmlns:p14="http://schemas.microsoft.com/office/powerpoint/2010/main" val="2397166173"/>
+      </p:ext>
+    </p:extLst>
+  </p:cSld>
+  <p:clrMapOvr>
+    <a:masterClrMapping/>
+  </p:clrMapOvr>
+</p:sld>
+</file>
+
+<file path=ppt/slides/slide8.xml><?xml version="1.0" encoding="utf-8"?>
+<p:sld xmlns:a="http://schemas.openxmlformats.org/drawingml/2006/main" xmlns:r="http://schemas.openxmlformats.org/officeDocument/2006/relationships" xmlns:p="http://schemas.openxmlformats.org/presentationml/2006/main">
+  <p:cSld>
+    <p:bg>
+      <p:bgPr>
+        <a:solidFill>
+          <a:schemeClr val="bg1"/>
+        </a:solidFill>
+        <a:effectLst/>
+      </p:bgPr>
+    </p:bg>
+    <p:spTree>
+      <p:nvGrpSpPr>
+        <p:cNvPr id="1" name=""/>
+        <p:cNvGrpSpPr/>
+        <p:nvPr/>
+      </p:nvGrpSpPr>
+      <p:grpSpPr>
+        <a:xfrm>
+          <a:off x="0" y="0"/>
+          <a:ext cx="0" cy="0"/>
+          <a:chOff x="0" y="0"/>
+          <a:chExt cx="0" cy="0"/>
+        </a:xfrm>
+      </p:grpSpPr>
+      <p:sp useBgFill="1">
+        <p:nvSpPr>
+          <p:cNvPr id="8" name="Rectangle 7">
+            <a:extLst>
+              <a:ext uri="{FF2B5EF4-FFF2-40B4-BE49-F238E27FC236}">
+                <a16:creationId xmlns:a16="http://schemas.microsoft.com/office/drawing/2014/main" id="{09588DA8-065E-4F6F-8EFD-43104AB2E0CF}"/>
+              </a:ext>
+              <a:ext uri="{C183D7F6-B498-43B3-948B-1728B52AA6E4}">
+                <adec:decorative xmlns:adec="http://schemas.microsoft.com/office/drawing/2017/decorative" val="1"/>
+              </a:ext>
+            </a:extLst>
+          </p:cNvPr>
+          <p:cNvSpPr>
+            <a:spLocks noGrp="1" noRot="1" noChangeAspect="1" noMove="1" noResize="1" noEditPoints="1" noAdjustHandles="1" noChangeArrowheads="1" noChangeShapeType="1" noTextEdit="1"/>
+          </p:cNvSpPr>
+          <p:nvPr>
+            <p:extLst>
+              <p:ext uri="{386F3935-93C4-4BCD-93E2-E3B085C9AB24}">
+                <p16:designElem xmlns:p16="http://schemas.microsoft.com/office/powerpoint/2015/main" val="1"/>
+              </p:ext>
+            </p:extLst>
+          </p:nvPr>
+        </p:nvSpPr>
+        <p:spPr>
+          <a:xfrm>
+            <a:off x="0" y="0"/>
+            <a:ext cx="12192000" cy="6858000"/>
+          </a:xfrm>
+          <a:prstGeom prst="rect">
+            <a:avLst/>
+          </a:prstGeom>
+          <a:ln w="12700" cap="flat" cmpd="sng" algn="ctr">
+            <a:noFill/>
+            <a:prstDash val="solid"/>
+            <a:miter lim="800000"/>
+          </a:ln>
+          <a:effectLst/>
+          <a:extLst>
+            <a:ext uri="{91240B29-F687-4F45-9708-019B960494DF}">
+              <a14:hiddenLine xmlns:a14="http://schemas.microsoft.com/office/drawing/2010/main" w="12700" cap="flat" cmpd="sng" algn="ctr">
+                <a:solidFill>
+                  <a:schemeClr val="accent1">
+                    <a:shade val="50000"/>
+                  </a:schemeClr>
+                </a:solidFill>
+                <a:prstDash val="solid"/>
+                <a:miter lim="800000"/>
+              </a14:hiddenLine>
+            </a:ext>
+          </a:extLst>
+        </p:spPr>
+        <p:style>
+          <a:lnRef idx="2">
+            <a:schemeClr val="accent1">
+              <a:shade val="50000"/>
+            </a:schemeClr>
+          </a:lnRef>
+          <a:fillRef idx="1">
+            <a:schemeClr val="accent1"/>
+          </a:fillRef>
+          <a:effectRef idx="0">
+            <a:schemeClr val="accent1"/>
+          </a:effectRef>
+          <a:fontRef idx="minor">
+            <a:schemeClr val="lt1"/>
+          </a:fontRef>
+        </p:style>
+        <p:txBody>
+          <a:bodyPr rtlCol="0" anchor="ctr"/>
+          <a:lstStyle/>
+          <a:p>
+            <a:pPr algn="ctr"/>
+            <a:endParaRPr lang="en-US"/>
+          </a:p>
+        </p:txBody>
+      </p:sp>
+      <p:sp useBgFill="1">
+        <p:nvSpPr>
+          <p:cNvPr id="10" name="Rectangle 9">
+            <a:extLst>
+              <a:ext uri="{FF2B5EF4-FFF2-40B4-BE49-F238E27FC236}">
+                <a16:creationId xmlns:a16="http://schemas.microsoft.com/office/drawing/2014/main" id="{C4285719-470E-454C-AF62-8323075F1F5B}"/>
+              </a:ext>
+              <a:ext uri="{C183D7F6-B498-43B3-948B-1728B52AA6E4}">
+                <adec:decorative xmlns:adec="http://schemas.microsoft.com/office/drawing/2017/decorative" val="1"/>
+              </a:ext>
+            </a:extLst>
+          </p:cNvPr>
+          <p:cNvSpPr>
+            <a:spLocks noGrp="1" noRot="1" noChangeAspect="1" noMove="1" noResize="1" noEditPoints="1" noAdjustHandles="1" noChangeArrowheads="1" noChangeShapeType="1" noTextEdit="1"/>
+          </p:cNvSpPr>
+          <p:nvPr>
+            <p:extLst>
+              <p:ext uri="{386F3935-93C4-4BCD-93E2-E3B085C9AB24}">
+                <p16:designElem xmlns:p16="http://schemas.microsoft.com/office/powerpoint/2015/main" val="1"/>
+              </p:ext>
+            </p:extLst>
+          </p:nvPr>
+        </p:nvSpPr>
+        <p:spPr>
+          <a:xfrm>
+            <a:off x="0" y="0"/>
+            <a:ext cx="12188952" cy="6858000"/>
+          </a:xfrm>
+          <a:prstGeom prst="rect">
+            <a:avLst/>
+          </a:prstGeom>
+          <a:ln w="12700" cap="flat" cmpd="sng" algn="ctr">
+            <a:noFill/>
+            <a:prstDash val="solid"/>
+            <a:miter lim="800000"/>
+          </a:ln>
+          <a:effectLst/>
+          <a:extLst>
+            <a:ext uri="{91240B29-F687-4F45-9708-019B960494DF}">
+              <a14:hiddenLine xmlns:a14="http://schemas.microsoft.com/office/drawing/2010/main" w="12700" cap="flat" cmpd="sng" algn="ctr">
+                <a:solidFill>
+                  <a:schemeClr val="accent1">
+                    <a:shade val="50000"/>
+                  </a:schemeClr>
+                </a:solidFill>
+                <a:prstDash val="solid"/>
+                <a:miter lim="800000"/>
+              </a14:hiddenLine>
+            </a:ext>
+          </a:extLst>
+        </p:spPr>
+        <p:style>
+          <a:lnRef idx="2">
+            <a:schemeClr val="accent1">
+              <a:shade val="50000"/>
+            </a:schemeClr>
+          </a:lnRef>
+          <a:fillRef idx="1">
+            <a:schemeClr val="accent1"/>
+          </a:fillRef>
+          <a:effectRef idx="0">
+            <a:schemeClr val="accent1"/>
+          </a:effectRef>
+          <a:fontRef idx="minor">
+            <a:schemeClr val="lt1"/>
+          </a:fontRef>
+        </p:style>
+        <p:txBody>
+          <a:bodyPr rtlCol="0" anchor="ctr"/>
+          <a:lstStyle/>
+          <a:p>
+            <a:pPr algn="ctr"/>
+            <a:endParaRPr lang="en-US"/>
+          </a:p>
+        </p:txBody>
+      </p:sp>
+      <p:sp>
+        <p:nvSpPr>
+          <p:cNvPr id="12" name="Rectangle 11">
+            <a:extLst>
+              <a:ext uri="{FF2B5EF4-FFF2-40B4-BE49-F238E27FC236}">
+                <a16:creationId xmlns:a16="http://schemas.microsoft.com/office/drawing/2014/main" id="{CD9FE4EF-C4D8-49A0-B2FF-81D8DB7D8A24}"/>
+              </a:ext>
+              <a:ext uri="{C183D7F6-B498-43B3-948B-1728B52AA6E4}">
+                <adec:decorative xmlns:adec="http://schemas.microsoft.com/office/drawing/2017/decorative" val="1"/>
+              </a:ext>
+            </a:extLst>
+          </p:cNvPr>
+          <p:cNvSpPr>
+            <a:spLocks noGrp="1" noRot="1" noChangeAspect="1" noMove="1" noResize="1" noEditPoints="1" noAdjustHandles="1" noChangeArrowheads="1" noChangeShapeType="1" noTextEdit="1"/>
+          </p:cNvSpPr>
+          <p:nvPr>
+            <p:extLst>
+              <p:ext uri="{386F3935-93C4-4BCD-93E2-E3B085C9AB24}">
+                <p16:designElem xmlns:p16="http://schemas.microsoft.com/office/powerpoint/2015/main" val="1"/>
+              </p:ext>
+            </p:extLst>
+          </p:nvPr>
+        </p:nvSpPr>
+        <p:spPr>
+          <a:xfrm rot="5400000" flipH="1">
+            <a:off x="-1410084" y="1410082"/>
+            <a:ext cx="6858000" cy="4037836"/>
+          </a:xfrm>
+          <a:prstGeom prst="rect">
+            <a:avLst/>
+          </a:prstGeom>
+          <a:gradFill>
+            <a:gsLst>
+              <a:gs pos="8000">
+                <a:srgbClr val="000000"/>
+              </a:gs>
+              <a:gs pos="100000">
+                <a:schemeClr val="accent1">
+                  <a:lumMod val="75000"/>
+                </a:schemeClr>
+              </a:gs>
+            </a:gsLst>
+            <a:lin ang="3000000" scaled="0"/>
+          </a:gradFill>
+          <a:ln>
+            <a:noFill/>
+          </a:ln>
+        </p:spPr>
+        <p:style>
+          <a:lnRef idx="2">
+            <a:schemeClr val="accent1">
+              <a:shade val="50000"/>
+            </a:schemeClr>
+          </a:lnRef>
+          <a:fillRef idx="1">
+            <a:schemeClr val="accent1"/>
+          </a:fillRef>
+          <a:effectRef idx="0">
+            <a:schemeClr val="accent1"/>
+          </a:effectRef>
+          <a:fontRef idx="minor">
+            <a:schemeClr val="lt1"/>
+          </a:fontRef>
+        </p:style>
+        <p:txBody>
+          <a:bodyPr rtlCol="0" anchor="ctr"/>
+          <a:lstStyle/>
+          <a:p>
+            <a:pPr algn="ctr"/>
+            <a:endParaRPr lang="en-US"/>
+          </a:p>
+        </p:txBody>
+      </p:sp>
+      <p:sp>
+        <p:nvSpPr>
+          <p:cNvPr id="14" name="Rectangle 13">
+            <a:extLst>
+              <a:ext uri="{FF2B5EF4-FFF2-40B4-BE49-F238E27FC236}">
+                <a16:creationId xmlns:a16="http://schemas.microsoft.com/office/drawing/2014/main" id="{4300840D-0A0B-4512-BACA-B439D5B9C57C}"/>
+              </a:ext>
+              <a:ext uri="{C183D7F6-B498-43B3-948B-1728B52AA6E4}">
+                <adec:decorative xmlns:adec="http://schemas.microsoft.com/office/drawing/2017/decorative" val="1"/>
+              </a:ext>
+            </a:extLst>
+          </p:cNvPr>
+          <p:cNvSpPr>
+            <a:spLocks noGrp="1" noRot="1" noChangeAspect="1" noMove="1" noResize="1" noEditPoints="1" noAdjustHandles="1" noChangeArrowheads="1" noChangeShapeType="1" noTextEdit="1"/>
+          </p:cNvSpPr>
+          <p:nvPr>
+            <p:extLst>
+              <p:ext uri="{386F3935-93C4-4BCD-93E2-E3B085C9AB24}">
+                <p16:designElem xmlns:p16="http://schemas.microsoft.com/office/powerpoint/2015/main" val="1"/>
+              </p:ext>
+            </p:extLst>
+          </p:nvPr>
+        </p:nvSpPr>
+        <p:spPr>
+          <a:xfrm rot="5400000" flipH="1">
+            <a:off x="-1410085" y="1420219"/>
+            <a:ext cx="6857999" cy="4037839"/>
+          </a:xfrm>
+          <a:prstGeom prst="rect">
+            <a:avLst/>
+          </a:prstGeom>
+          <a:gradFill>
+            <a:gsLst>
+              <a:gs pos="0">
+                <a:srgbClr val="000000">
+                  <a:alpha val="0"/>
+                </a:srgbClr>
+              </a:gs>
+              <a:gs pos="99000">
+                <a:schemeClr val="accent1">
+                  <a:alpha val="46000"/>
+                </a:schemeClr>
+              </a:gs>
+            </a:gsLst>
+            <a:lin ang="1800000" scaled="0"/>
+          </a:gradFill>
+          <a:ln>
+            <a:noFill/>
+          </a:ln>
+        </p:spPr>
+        <p:style>
+          <a:lnRef idx="2">
+            <a:schemeClr val="accent1">
+              <a:shade val="50000"/>
+            </a:schemeClr>
+          </a:lnRef>
+          <a:fillRef idx="1">
+            <a:schemeClr val="accent1"/>
+          </a:fillRef>
+          <a:effectRef idx="0">
+            <a:schemeClr val="accent1"/>
+          </a:effectRef>
+          <a:fontRef idx="minor">
+            <a:schemeClr val="lt1"/>
+          </a:fontRef>
+        </p:style>
+        <p:txBody>
+          <a:bodyPr rtlCol="0" anchor="ctr"/>
+          <a:lstStyle/>
+          <a:p>
+            <a:pPr algn="ctr"/>
+            <a:endParaRPr lang="en-US"/>
+          </a:p>
+        </p:txBody>
+      </p:sp>
+      <p:sp>
+        <p:nvSpPr>
+          <p:cNvPr id="16" name="Rectangle 15">
+            <a:extLst>
+              <a:ext uri="{FF2B5EF4-FFF2-40B4-BE49-F238E27FC236}">
+                <a16:creationId xmlns:a16="http://schemas.microsoft.com/office/drawing/2014/main" id="{D2B78728-A580-49A7-84F9-6EF6F583ADE0}"/>
+              </a:ext>
+              <a:ext uri="{C183D7F6-B498-43B3-948B-1728B52AA6E4}">
+                <adec:decorative xmlns:adec="http://schemas.microsoft.com/office/drawing/2017/decorative" val="1"/>
+              </a:ext>
+            </a:extLst>
+          </p:cNvPr>
+          <p:cNvSpPr>
+            <a:spLocks noGrp="1" noRot="1" noChangeAspect="1" noMove="1" noResize="1" noEditPoints="1" noAdjustHandles="1" noChangeArrowheads="1" noChangeShapeType="1" noTextEdit="1"/>
+          </p:cNvSpPr>
+          <p:nvPr>
+            <p:extLst>
+              <p:ext uri="{386F3935-93C4-4BCD-93E2-E3B085C9AB24}">
+                <p16:designElem xmlns:p16="http://schemas.microsoft.com/office/powerpoint/2015/main" val="1"/>
+              </p:ext>
+            </p:extLst>
+          </p:nvPr>
+        </p:nvSpPr>
+        <p:spPr>
+          <a:xfrm rot="5400000" flipH="1">
+            <a:off x="767923" y="3588085"/>
+            <a:ext cx="2501979" cy="4037841"/>
+          </a:xfrm>
+          <a:prstGeom prst="rect">
+            <a:avLst/>
+          </a:prstGeom>
+          <a:gradFill>
+            <a:gsLst>
+              <a:gs pos="2000">
+                <a:schemeClr val="accent1">
+                  <a:alpha val="29000"/>
+                </a:schemeClr>
+              </a:gs>
+              <a:gs pos="100000">
+                <a:srgbClr val="000000">
+                  <a:alpha val="30000"/>
+                </a:srgbClr>
+              </a:gs>
+            </a:gsLst>
+            <a:lin ang="7800000" scaled="0"/>
+          </a:gradFill>
+          <a:ln>
+            <a:noFill/>
+          </a:ln>
+        </p:spPr>
+        <p:style>
+          <a:lnRef idx="2">
+            <a:schemeClr val="accent1">
+              <a:shade val="50000"/>
+            </a:schemeClr>
+          </a:lnRef>
+          <a:fillRef idx="1">
+            <a:schemeClr val="accent1"/>
+          </a:fillRef>
+          <a:effectRef idx="0">
+            <a:schemeClr val="accent1"/>
+          </a:effectRef>
+          <a:fontRef idx="minor">
+            <a:schemeClr val="lt1"/>
+          </a:fontRef>
+        </p:style>
+        <p:txBody>
+          <a:bodyPr rtlCol="0" anchor="ctr"/>
+          <a:lstStyle/>
+          <a:p>
+            <a:pPr algn="ctr"/>
+            <a:endParaRPr lang="en-US" dirty="0"/>
+          </a:p>
+        </p:txBody>
+      </p:sp>
+      <p:sp>
+        <p:nvSpPr>
+          <p:cNvPr id="18" name="Freeform: Shape 17">
+            <a:extLst>
+              <a:ext uri="{FF2B5EF4-FFF2-40B4-BE49-F238E27FC236}">
+                <a16:creationId xmlns:a16="http://schemas.microsoft.com/office/drawing/2014/main" id="{38FAA1A1-D861-433F-88FA-1E9D6FD31D11}"/>
+              </a:ext>
+              <a:ext uri="{C183D7F6-B498-43B3-948B-1728B52AA6E4}">
+                <adec:decorative xmlns:adec="http://schemas.microsoft.com/office/drawing/2017/decorative" val="1"/>
+              </a:ext>
+            </a:extLst>
+          </p:cNvPr>
+          <p:cNvSpPr>
+            <a:spLocks noGrp="1" noRot="1" noChangeAspect="1" noMove="1" noResize="1" noEditPoints="1" noAdjustHandles="1" noChangeArrowheads="1" noChangeShapeType="1" noTextEdit="1"/>
+          </p:cNvSpPr>
+          <p:nvPr>
+            <p:extLst>
+              <p:ext uri="{386F3935-93C4-4BCD-93E2-E3B085C9AB24}">
+                <p16:designElem xmlns:p16="http://schemas.microsoft.com/office/powerpoint/2015/main" val="1"/>
+              </p:ext>
+            </p:extLst>
+          </p:nvPr>
+        </p:nvSpPr>
+        <p:spPr>
+          <a:xfrm rot="20635413">
+            <a:off x="-501737" y="969718"/>
+            <a:ext cx="3900357" cy="4178958"/>
+          </a:xfrm>
+          <a:custGeom>
+            <a:avLst/>
+            <a:gdLst>
+              <a:gd name="connsiteX0" fmla="*/ 2432225 w 3900357"/>
+              <a:gd name="connsiteY0" fmla="*/ 93939 h 4178958"/>
+              <a:gd name="connsiteX1" fmla="*/ 3900357 w 3900357"/>
+              <a:gd name="connsiteY1" fmla="*/ 2089479 h 4178958"/>
+              <a:gd name="connsiteX2" fmla="*/ 1810878 w 3900357"/>
+              <a:gd name="connsiteY2" fmla="*/ 4178958 h 4178958"/>
+              <a:gd name="connsiteX3" fmla="*/ 78249 w 3900357"/>
+              <a:gd name="connsiteY3" fmla="*/ 3257727 h 4178958"/>
+              <a:gd name="connsiteX4" fmla="*/ 0 w 3900357"/>
+              <a:gd name="connsiteY4" fmla="*/ 3128923 h 4178958"/>
+              <a:gd name="connsiteX5" fmla="*/ 831324 w 3900357"/>
+              <a:gd name="connsiteY5" fmla="*/ 244281 h 4178958"/>
+              <a:gd name="connsiteX6" fmla="*/ 997559 w 3900357"/>
+              <a:gd name="connsiteY6" fmla="*/ 164202 h 4178958"/>
+              <a:gd name="connsiteX7" fmla="*/ 1810878 w 3900357"/>
+              <a:gd name="connsiteY7" fmla="*/ 0 h 4178958"/>
+              <a:gd name="connsiteX8" fmla="*/ 2432225 w 3900357"/>
+              <a:gd name="connsiteY8" fmla="*/ 93939 h 4178958"/>
+            </a:gdLst>
+            <a:ahLst/>
+            <a:cxnLst>
+              <a:cxn ang="0">
+                <a:pos x="connsiteX0" y="connsiteY0"/>
+              </a:cxn>
+              <a:cxn ang="0">
+                <a:pos x="connsiteX1" y="connsiteY1"/>
+              </a:cxn>
+              <a:cxn ang="0">
+                <a:pos x="connsiteX2" y="connsiteY2"/>
+              </a:cxn>
+              <a:cxn ang="0">
+                <a:pos x="connsiteX3" y="connsiteY3"/>
+              </a:cxn>
+              <a:cxn ang="0">
+                <a:pos x="connsiteX4" y="connsiteY4"/>
+              </a:cxn>
+              <a:cxn ang="0">
+                <a:pos x="connsiteX5" y="connsiteY5"/>
+              </a:cxn>
+              <a:cxn ang="0">
+                <a:pos x="connsiteX6" y="connsiteY6"/>
+              </a:cxn>
+              <a:cxn ang="0">
+                <a:pos x="connsiteX7" y="connsiteY7"/>
+              </a:cxn>
+              <a:cxn ang="0">
+                <a:pos x="connsiteX8" y="connsiteY8"/>
+              </a:cxn>
+            </a:cxnLst>
+            <a:rect l="l" t="t" r="r" b="b"/>
+            <a:pathLst>
+              <a:path w="3900357" h="4178958">
+                <a:moveTo>
+                  <a:pt x="2432225" y="93939"/>
+                </a:moveTo>
+                <a:cubicBezTo>
+                  <a:pt x="3282786" y="358491"/>
+                  <a:pt x="3900357" y="1151865"/>
+                  <a:pt x="3900357" y="2089479"/>
+                </a:cubicBezTo>
+                <a:cubicBezTo>
+                  <a:pt x="3900357" y="3243466"/>
+                  <a:pt x="2964865" y="4178958"/>
+                  <a:pt x="1810878" y="4178958"/>
+                </a:cubicBezTo>
+                <a:cubicBezTo>
+                  <a:pt x="1089636" y="4178958"/>
+                  <a:pt x="453744" y="3813531"/>
+                  <a:pt x="78249" y="3257727"/>
+                </a:cubicBezTo>
+                <a:lnTo>
+                  <a:pt x="0" y="3128923"/>
+                </a:lnTo>
+                <a:lnTo>
+                  <a:pt x="831324" y="244281"/>
+                </a:lnTo>
+                <a:lnTo>
+                  <a:pt x="997559" y="164202"/>
+                </a:lnTo>
+                <a:cubicBezTo>
+                  <a:pt x="1247540" y="58468"/>
+                  <a:pt x="1522381" y="0"/>
+                  <a:pt x="1810878" y="0"/>
+                </a:cubicBezTo>
+                <a:cubicBezTo>
+                  <a:pt x="2027251" y="0"/>
+                  <a:pt x="2235942" y="32888"/>
+                  <a:pt x="2432225" y="93939"/>
+                </a:cubicBezTo>
+                <a:close/>
+              </a:path>
+            </a:pathLst>
+          </a:custGeom>
+          <a:gradFill>
+            <a:gsLst>
+              <a:gs pos="29000">
+                <a:srgbClr val="000000">
+                  <a:alpha val="0"/>
+                </a:srgbClr>
+              </a:gs>
+              <a:gs pos="100000">
+                <a:schemeClr val="accent1">
+                  <a:alpha val="43000"/>
+                </a:schemeClr>
+              </a:gs>
+            </a:gsLst>
+            <a:lin ang="1800000" scaled="0"/>
+          </a:gradFill>
+          <a:ln>
+            <a:noFill/>
+          </a:ln>
+        </p:spPr>
+        <p:style>
+          <a:lnRef idx="2">
+            <a:schemeClr val="accent1">
+              <a:shade val="50000"/>
+            </a:schemeClr>
+          </a:lnRef>
+          <a:fillRef idx="1">
+            <a:schemeClr val="accent1"/>
+          </a:fillRef>
+          <a:effectRef idx="0">
+            <a:schemeClr val="accent1"/>
+          </a:effectRef>
+          <a:fontRef idx="minor">
+            <a:schemeClr val="lt1"/>
+          </a:fontRef>
+        </p:style>
+        <p:txBody>
+          <a:bodyPr wrap="square" rtlCol="0" anchor="ctr">
+            <a:noAutofit/>
+          </a:bodyPr>
+          <a:lstStyle/>
+          <a:p>
+            <a:pPr algn="ctr"/>
+            <a:endParaRPr lang="en-US" dirty="0"/>
+          </a:p>
+        </p:txBody>
+      </p:sp>
+      <p:sp>
+        <p:nvSpPr>
+          <p:cNvPr id="20" name="Rectangle 19">
+            <a:extLst>
+              <a:ext uri="{FF2B5EF4-FFF2-40B4-BE49-F238E27FC236}">
+                <a16:creationId xmlns:a16="http://schemas.microsoft.com/office/drawing/2014/main" id="{8D71EDA1-87BF-4D5D-AB79-F346FD19278A}"/>
+              </a:ext>
+              <a:ext uri="{C183D7F6-B498-43B3-948B-1728B52AA6E4}">
+                <adec:decorative xmlns:adec="http://schemas.microsoft.com/office/drawing/2017/decorative" val="1"/>
+              </a:ext>
+            </a:extLst>
+          </p:cNvPr>
+          <p:cNvSpPr>
+            <a:spLocks noGrp="1" noRot="1" noChangeAspect="1" noMove="1" noResize="1" noEditPoints="1" noAdjustHandles="1" noChangeArrowheads="1" noChangeShapeType="1" noTextEdit="1"/>
+          </p:cNvSpPr>
+          <p:nvPr>
+            <p:extLst>
+              <p:ext uri="{386F3935-93C4-4BCD-93E2-E3B085C9AB24}">
+                <p16:designElem xmlns:p16="http://schemas.microsoft.com/office/powerpoint/2015/main" val="1"/>
+              </p:ext>
+            </p:extLst>
+          </p:nvPr>
+        </p:nvSpPr>
+        <p:spPr>
+          <a:xfrm rot="5400000" flipH="1">
+            <a:off x="-1410093" y="1399943"/>
+            <a:ext cx="6858003" cy="4037835"/>
+          </a:xfrm>
+          <a:prstGeom prst="rect">
+            <a:avLst/>
+          </a:prstGeom>
+          <a:gradFill>
+            <a:gsLst>
+              <a:gs pos="0">
+                <a:srgbClr val="000000">
+                  <a:alpha val="0"/>
+                </a:srgbClr>
+              </a:gs>
+              <a:gs pos="99000">
+                <a:schemeClr val="accent1">
+                  <a:lumMod val="60000"/>
+                  <a:lumOff val="40000"/>
+                  <a:alpha val="11000"/>
+                </a:schemeClr>
+              </a:gs>
+            </a:gsLst>
+            <a:lin ang="7200000" scaled="0"/>
+          </a:gradFill>
+          <a:ln>
+            <a:noFill/>
+          </a:ln>
+        </p:spPr>
+        <p:style>
+          <a:lnRef idx="2">
+            <a:schemeClr val="accent1">
+              <a:shade val="50000"/>
+            </a:schemeClr>
+          </a:lnRef>
+          <a:fillRef idx="1">
+            <a:schemeClr val="accent1"/>
+          </a:fillRef>
+          <a:effectRef idx="0">
+            <a:schemeClr val="accent1"/>
+          </a:effectRef>
+          <a:fontRef idx="minor">
+            <a:schemeClr val="lt1"/>
+          </a:fontRef>
+        </p:style>
+        <p:txBody>
+          <a:bodyPr rtlCol="0" anchor="ctr"/>
+          <a:lstStyle/>
+          <a:p>
+            <a:pPr algn="ctr"/>
+            <a:endParaRPr lang="en-US"/>
+          </a:p>
+        </p:txBody>
+      </p:sp>
+      <p:sp>
+        <p:nvSpPr>
+          <p:cNvPr id="2" name="Title 1">
+            <a:extLst>
+              <a:ext uri="{FF2B5EF4-FFF2-40B4-BE49-F238E27FC236}">
+                <a16:creationId xmlns:a16="http://schemas.microsoft.com/office/drawing/2014/main" id="{775F081D-48AD-43CC-9069-DC3E2B6B176C}"/>
+              </a:ext>
+            </a:extLst>
+          </p:cNvPr>
+          <p:cNvSpPr>
+            <a:spLocks noGrp="1"/>
+          </p:cNvSpPr>
+          <p:nvPr>
+            <p:ph type="title"/>
+          </p:nvPr>
+        </p:nvSpPr>
+        <p:spPr>
+          <a:xfrm>
+            <a:off x="466722" y="586855"/>
+            <a:ext cx="3201366" cy="3387497"/>
+          </a:xfrm>
+        </p:spPr>
+        <p:txBody>
+          <a:bodyPr anchor="b">
+            <a:normAutofit/>
+          </a:bodyPr>
+          <a:lstStyle/>
+          <a:p>
+            <a:pPr algn="r"/>
+            <a:r>
+              <a:rPr lang="en-SE" sz="4000" dirty="0">
+                <a:solidFill>
+                  <a:srgbClr val="FFFFFF"/>
+                </a:solidFill>
+              </a:rPr>
+              <a:t>4 </a:t>
+            </a:r>
+            <a:r>
+              <a:rPr lang="en-SE" sz="4000" dirty="0" err="1">
+                <a:solidFill>
+                  <a:srgbClr val="FFFFFF"/>
+                </a:solidFill>
+              </a:rPr>
+              <a:t>exempel</a:t>
+            </a:r>
+            <a:r>
+              <a:rPr lang="en-SE" sz="4000" dirty="0">
+                <a:solidFill>
+                  <a:srgbClr val="FFFFFF"/>
+                </a:solidFill>
+              </a:rPr>
+              <a:t> </a:t>
+            </a:r>
+            <a:r>
+              <a:rPr lang="en-SE" sz="4000" dirty="0" err="1">
+                <a:solidFill>
+                  <a:srgbClr val="FFFFFF"/>
+                </a:solidFill>
+              </a:rPr>
+              <a:t>från</a:t>
+            </a:r>
+            <a:r>
+              <a:rPr lang="en-SE" sz="4000" dirty="0">
+                <a:solidFill>
+                  <a:srgbClr val="FFFFFF"/>
+                </a:solidFill>
+              </a:rPr>
+              <a:t> </a:t>
+            </a:r>
+            <a:r>
+              <a:rPr lang="en-SE" sz="4000" dirty="0" err="1">
+                <a:solidFill>
+                  <a:srgbClr val="FFFFFF"/>
+                </a:solidFill>
+              </a:rPr>
+              <a:t>vår</a:t>
+            </a:r>
+            <a:r>
+              <a:rPr lang="en-SE" sz="4000" dirty="0">
+                <a:solidFill>
+                  <a:srgbClr val="FFFFFF"/>
+                </a:solidFill>
+              </a:rPr>
+              <a:t> </a:t>
+            </a:r>
+            <a:r>
+              <a:rPr lang="en-SE" sz="4000" dirty="0" err="1">
+                <a:solidFill>
+                  <a:srgbClr val="FFFFFF"/>
+                </a:solidFill>
+              </a:rPr>
+              <a:t>kod</a:t>
+            </a:r>
+            <a:endParaRPr lang="en-SE" sz="4000" dirty="0">
+              <a:solidFill>
+                <a:srgbClr val="FFFFFF"/>
+              </a:solidFill>
+            </a:endParaRPr>
+          </a:p>
+        </p:txBody>
+      </p:sp>
+      <p:sp>
+        <p:nvSpPr>
+          <p:cNvPr id="3" name="Content Placeholder 2">
+            <a:extLst>
+              <a:ext uri="{FF2B5EF4-FFF2-40B4-BE49-F238E27FC236}">
+                <a16:creationId xmlns:a16="http://schemas.microsoft.com/office/drawing/2014/main" id="{5D2C8936-7391-47D0-AC57-6F7CDFDB0A9A}"/>
+              </a:ext>
+            </a:extLst>
+          </p:cNvPr>
+          <p:cNvSpPr>
+            <a:spLocks noGrp="1"/>
+          </p:cNvSpPr>
+          <p:nvPr>
+            <p:ph idx="1"/>
+          </p:nvPr>
+        </p:nvSpPr>
+        <p:spPr>
+          <a:xfrm>
+            <a:off x="4367695" y="666114"/>
+            <a:ext cx="7531697" cy="5546047"/>
+          </a:xfrm>
+        </p:spPr>
+        <p:txBody>
+          <a:bodyPr anchor="ctr">
+            <a:normAutofit/>
+          </a:bodyPr>
+          <a:lstStyle/>
+          <a:p>
+            <a:pPr marL="457200" indent="-457200">
+              <a:buFont typeface="+mj-lt"/>
+              <a:buAutoNum type="arabicPeriod"/>
+            </a:pPr>
+            <a:r>
+              <a:rPr lang="en-SE" sz="2400" dirty="0" err="1"/>
+              <a:t>Spelmotorn</a:t>
+            </a:r>
+            <a:r>
+              <a:rPr lang="en-SE" sz="2400" dirty="0"/>
+              <a:t> </a:t>
+            </a:r>
+            <a:r>
+              <a:rPr lang="en-SE" sz="2400" dirty="0" err="1"/>
+              <a:t>är</a:t>
+            </a:r>
+            <a:r>
+              <a:rPr lang="en-SE" sz="2400" dirty="0"/>
+              <a:t> </a:t>
+            </a:r>
+            <a:r>
+              <a:rPr lang="en-SE" sz="2400" dirty="0" err="1"/>
+              <a:t>oberoende</a:t>
+            </a:r>
+            <a:r>
+              <a:rPr lang="en-SE" sz="2400" dirty="0"/>
+              <a:t> av </a:t>
+            </a:r>
+            <a:r>
+              <a:rPr lang="en-SE" sz="2400" dirty="0" err="1"/>
+              <a:t>gränssnittet</a:t>
+            </a:r>
+            <a:endParaRPr lang="en-SE" sz="2400" dirty="0"/>
+          </a:p>
+          <a:p>
+            <a:pPr marL="457200" indent="-457200">
+              <a:buFont typeface="+mj-lt"/>
+              <a:buAutoNum type="arabicPeriod"/>
+            </a:pPr>
+            <a:r>
+              <a:rPr lang="en-SE" sz="2400" dirty="0" err="1"/>
+              <a:t>Hur</a:t>
+            </a:r>
+            <a:r>
+              <a:rPr lang="en-SE" sz="2400" dirty="0"/>
+              <a:t> vi </a:t>
+            </a:r>
+            <a:r>
+              <a:rPr lang="en-SE" sz="2400" dirty="0" err="1"/>
+              <a:t>valt</a:t>
+            </a:r>
+            <a:r>
+              <a:rPr lang="en-SE" sz="2400" dirty="0"/>
+              <a:t> </a:t>
+            </a:r>
+            <a:r>
+              <a:rPr lang="en-SE" sz="2400" dirty="0" err="1"/>
+              <a:t>att</a:t>
+            </a:r>
+            <a:r>
+              <a:rPr lang="en-SE" sz="2400" dirty="0"/>
+              <a:t> </a:t>
+            </a:r>
+            <a:r>
+              <a:rPr lang="en-SE" sz="2400" dirty="0" err="1"/>
+              <a:t>representera</a:t>
+            </a:r>
+            <a:r>
+              <a:rPr lang="en-SE" sz="2400" dirty="0"/>
+              <a:t> de </a:t>
+            </a:r>
+            <a:r>
+              <a:rPr lang="en-SE" sz="2400" dirty="0" err="1"/>
+              <a:t>olika</a:t>
+            </a:r>
+            <a:r>
+              <a:rPr lang="en-SE" sz="2400" dirty="0"/>
+              <a:t> </a:t>
+            </a:r>
+            <a:r>
+              <a:rPr lang="en-SE" sz="2400" dirty="0" err="1"/>
+              <a:t>pjästyperna</a:t>
+            </a:r>
+            <a:endParaRPr lang="en-SE" sz="2400" dirty="0"/>
+          </a:p>
+          <a:p>
+            <a:pPr marL="457200" indent="-457200">
+              <a:buFont typeface="+mj-lt"/>
+              <a:buAutoNum type="arabicPeriod"/>
+            </a:pPr>
+            <a:r>
+              <a:rPr lang="en-SE" sz="2400" dirty="0" err="1"/>
+              <a:t>Hur</a:t>
+            </a:r>
+            <a:r>
+              <a:rPr lang="en-SE" sz="2400" dirty="0"/>
+              <a:t> vi </a:t>
+            </a:r>
+            <a:r>
+              <a:rPr lang="en-SE" sz="2400" dirty="0" err="1"/>
+              <a:t>använt</a:t>
+            </a:r>
+            <a:r>
+              <a:rPr lang="en-SE" sz="2400" dirty="0"/>
+              <a:t> reflection </a:t>
+            </a:r>
+            <a:r>
+              <a:rPr lang="en-SE" sz="2400" dirty="0" err="1"/>
+              <a:t>för</a:t>
+            </a:r>
+            <a:r>
+              <a:rPr lang="en-SE" sz="2400" dirty="0"/>
+              <a:t> </a:t>
+            </a:r>
+            <a:r>
+              <a:rPr lang="en-SE" sz="2400" dirty="0" err="1"/>
+              <a:t>instantiering</a:t>
+            </a:r>
+            <a:r>
+              <a:rPr lang="en-SE" sz="2400" dirty="0"/>
+              <a:t> av </a:t>
+            </a:r>
+            <a:r>
+              <a:rPr lang="en-SE" sz="2400" dirty="0" err="1"/>
+              <a:t>rätt</a:t>
+            </a:r>
+            <a:r>
+              <a:rPr lang="en-SE" sz="2400" dirty="0"/>
+              <a:t> </a:t>
+            </a:r>
+            <a:r>
+              <a:rPr lang="en-SE" sz="2400" dirty="0" err="1"/>
+              <a:t>pjästyp</a:t>
+            </a:r>
+            <a:endParaRPr lang="en-SE" sz="2400" dirty="0"/>
+          </a:p>
+          <a:p>
+            <a:pPr marL="457200" indent="-457200">
+              <a:buFont typeface="+mj-lt"/>
+              <a:buAutoNum type="arabicPeriod"/>
+            </a:pPr>
+            <a:r>
+              <a:rPr lang="en-SE" sz="2400" dirty="0" err="1"/>
+              <a:t>Hur</a:t>
+            </a:r>
+            <a:r>
+              <a:rPr lang="en-SE" sz="2400" dirty="0"/>
+              <a:t> vi </a:t>
+            </a:r>
+            <a:r>
+              <a:rPr lang="en-SE" sz="2400" dirty="0" err="1"/>
+              <a:t>försökt</a:t>
+            </a:r>
+            <a:r>
+              <a:rPr lang="en-SE" sz="2400" dirty="0"/>
+              <a:t> </a:t>
+            </a:r>
+            <a:r>
+              <a:rPr lang="en-SE" sz="2400" dirty="0" err="1"/>
+              <a:t>hålla</a:t>
+            </a:r>
+            <a:r>
+              <a:rPr lang="en-SE" sz="2400" dirty="0"/>
+              <a:t> </a:t>
+            </a:r>
+            <a:r>
+              <a:rPr lang="en-SE" sz="2400" dirty="0" err="1"/>
+              <a:t>metoderna</a:t>
+            </a:r>
+            <a:r>
+              <a:rPr lang="en-SE" sz="2400" dirty="0"/>
+              <a:t> </a:t>
+            </a:r>
+            <a:r>
+              <a:rPr lang="en-SE" sz="2400" dirty="0" err="1"/>
+              <a:t>relativt</a:t>
+            </a:r>
+            <a:r>
+              <a:rPr lang="en-SE" sz="2400" dirty="0"/>
+              <a:t> </a:t>
+            </a:r>
+            <a:r>
+              <a:rPr lang="en-SE" sz="2400" dirty="0" err="1"/>
+              <a:t>korta</a:t>
+            </a:r>
+            <a:endParaRPr lang="en-SE" sz="2400" dirty="0"/>
+          </a:p>
+        </p:txBody>
+      </p:sp>
+    </p:spTree>
+    <p:extLst>
+      <p:ext uri="{BB962C8B-B14F-4D97-AF65-F5344CB8AC3E}">
+        <p14:creationId xmlns:p14="http://schemas.microsoft.com/office/powerpoint/2010/main" val="2098023408"/>
+      </p:ext>
+    </p:extLst>
+  </p:cSld>
+  <p:clrMapOvr>
+    <a:masterClrMapping/>
+  </p:clrMapOvr>
+</p:sld>
+</file>
+
+<file path=ppt/slides/slide9.xml><?xml version="1.0" encoding="utf-8"?>
+<p:sld xmlns:a="http://schemas.openxmlformats.org/drawingml/2006/main" xmlns:r="http://schemas.openxmlformats.org/officeDocument/2006/relationships" xmlns:p="http://schemas.openxmlformats.org/presentationml/2006/main">
+  <p:cSld>
+    <p:spTree>
+      <p:nvGrpSpPr>
+        <p:cNvPr id="1" name=""/>
+        <p:cNvGrpSpPr/>
+        <p:nvPr/>
+      </p:nvGrpSpPr>
+      <p:grpSpPr>
+        <a:xfrm>
+          <a:off x="0" y="0"/>
+          <a:ext cx="0" cy="0"/>
+          <a:chOff x="0" y="0"/>
+          <a:chExt cx="0" cy="0"/>
+        </a:xfrm>
+      </p:grpSpPr>
+      <p:sp>
+        <p:nvSpPr>
+          <p:cNvPr id="2" name="Title 1">
+            <a:extLst>
+              <a:ext uri="{FF2B5EF4-FFF2-40B4-BE49-F238E27FC236}">
+                <a16:creationId xmlns:a16="http://schemas.microsoft.com/office/drawing/2014/main" id="{82F64D03-7EA4-47F9-ACE8-0796BC60A226}"/>
+              </a:ext>
+            </a:extLst>
+          </p:cNvPr>
+          <p:cNvSpPr>
+            <a:spLocks noGrp="1"/>
+          </p:cNvSpPr>
+          <p:nvPr>
+            <p:ph type="title"/>
+          </p:nvPr>
+        </p:nvSpPr>
+        <p:spPr/>
+        <p:txBody>
+          <a:bodyPr/>
+          <a:lstStyle/>
+          <a:p>
+            <a:r>
+              <a:rPr lang="en-SE" dirty="0"/>
+              <a:t>1. </a:t>
+            </a:r>
+            <a:r>
+              <a:rPr lang="en-SE" dirty="0" err="1"/>
+              <a:t>Spelmotorn</a:t>
+            </a:r>
+            <a:r>
+              <a:rPr lang="en-SE" dirty="0"/>
+              <a:t> </a:t>
+            </a:r>
+            <a:r>
+              <a:rPr lang="en-SE" dirty="0" err="1"/>
+              <a:t>oberoende</a:t>
+            </a:r>
+            <a:r>
+              <a:rPr lang="en-SE" dirty="0"/>
+              <a:t> av </a:t>
+            </a:r>
+            <a:r>
+              <a:rPr lang="en-SE" dirty="0" err="1"/>
+              <a:t>gränssnitt</a:t>
+            </a:r>
+            <a:endParaRPr lang="en-SE" dirty="0"/>
+          </a:p>
+        </p:txBody>
+      </p:sp>
+      <p:sp>
+        <p:nvSpPr>
+          <p:cNvPr id="3" name="Content Placeholder 2">
+            <a:extLst>
+              <a:ext uri="{FF2B5EF4-FFF2-40B4-BE49-F238E27FC236}">
+                <a16:creationId xmlns:a16="http://schemas.microsoft.com/office/drawing/2014/main" id="{77B55240-66C4-4730-9F13-64E473F9659B}"/>
+              </a:ext>
+            </a:extLst>
+          </p:cNvPr>
+          <p:cNvSpPr>
+            <a:spLocks noGrp="1"/>
+          </p:cNvSpPr>
+          <p:nvPr>
+            <p:ph idx="1"/>
+          </p:nvPr>
+        </p:nvSpPr>
+        <p:spPr/>
+        <p:txBody>
+          <a:bodyPr/>
+          <a:lstStyle/>
+          <a:p>
+            <a:pPr>
+              <a:buFont typeface="Wingdings" panose="05000000000000000000" pitchFamily="2" charset="2"/>
+              <a:buChar char="§"/>
+            </a:pPr>
+            <a:r>
+              <a:rPr lang="en-SE" dirty="0"/>
+              <a:t>All </a:t>
+            </a:r>
+            <a:r>
+              <a:rPr lang="en-SE" dirty="0" err="1"/>
+              <a:t>logik</a:t>
+            </a:r>
+            <a:r>
+              <a:rPr lang="en-SE" dirty="0"/>
+              <a:t> </a:t>
+            </a:r>
+            <a:r>
+              <a:rPr lang="en-SE" dirty="0" err="1"/>
+              <a:t>som</a:t>
+            </a:r>
+            <a:r>
+              <a:rPr lang="en-SE" dirty="0"/>
+              <a:t> </a:t>
+            </a:r>
+            <a:r>
+              <a:rPr lang="en-SE" dirty="0" err="1"/>
+              <a:t>använder</a:t>
+            </a:r>
+            <a:r>
+              <a:rPr lang="en-SE" dirty="0"/>
+              <a:t> </a:t>
+            </a:r>
+            <a:r>
+              <a:rPr lang="en-SE" dirty="0" err="1"/>
+              <a:t>konsolen</a:t>
+            </a:r>
+            <a:r>
+              <a:rPr lang="en-SE" dirty="0"/>
+              <a:t> </a:t>
+            </a:r>
+            <a:r>
+              <a:rPr lang="en-SE" dirty="0" err="1"/>
+              <a:t>finns</a:t>
+            </a:r>
+            <a:r>
+              <a:rPr lang="en-SE" dirty="0"/>
+              <a:t> </a:t>
+            </a:r>
+            <a:r>
+              <a:rPr lang="en-SE" dirty="0" err="1"/>
+              <a:t>i</a:t>
+            </a:r>
+            <a:r>
+              <a:rPr lang="en-SE" dirty="0"/>
+              <a:t> Console-</a:t>
+            </a:r>
+            <a:r>
+              <a:rPr lang="en-SE" dirty="0" err="1"/>
+              <a:t>projektet</a:t>
+            </a:r>
+            <a:endParaRPr lang="en-SE" dirty="0"/>
+          </a:p>
+          <a:p>
+            <a:pPr lvl="1">
+              <a:buFont typeface="Wingdings" panose="05000000000000000000" pitchFamily="2" charset="2"/>
+              <a:buChar char="§"/>
+            </a:pPr>
+            <a:r>
+              <a:rPr lang="en-SE" dirty="0"/>
+              <a:t>Console-</a:t>
+            </a:r>
+            <a:r>
+              <a:rPr lang="en-SE" dirty="0" err="1"/>
+              <a:t>projektet</a:t>
+            </a:r>
+            <a:r>
+              <a:rPr lang="en-SE" dirty="0"/>
+              <a:t> </a:t>
+            </a:r>
+            <a:r>
+              <a:rPr lang="en-SE" dirty="0" err="1"/>
+              <a:t>anropar</a:t>
+            </a:r>
+            <a:r>
+              <a:rPr lang="en-SE" dirty="0"/>
+              <a:t> </a:t>
+            </a:r>
+            <a:r>
+              <a:rPr lang="en-SE" dirty="0" err="1"/>
+              <a:t>spelmotorn</a:t>
+            </a:r>
+            <a:r>
+              <a:rPr lang="en-SE" dirty="0"/>
+              <a:t> </a:t>
+            </a:r>
+            <a:r>
+              <a:rPr lang="en-SE" dirty="0" err="1"/>
+              <a:t>och</a:t>
+            </a:r>
+            <a:r>
+              <a:rPr lang="en-SE" dirty="0"/>
+              <a:t> </a:t>
+            </a:r>
+            <a:r>
+              <a:rPr lang="en-SE" dirty="0" err="1"/>
+              <a:t>använder</a:t>
+            </a:r>
+            <a:r>
+              <a:rPr lang="en-SE" dirty="0"/>
+              <a:t> </a:t>
+            </a:r>
+            <a:r>
+              <a:rPr lang="en-SE" dirty="0" err="1"/>
+              <a:t>returvärdet</a:t>
+            </a:r>
+            <a:r>
+              <a:rPr lang="en-SE" dirty="0"/>
+              <a:t> </a:t>
+            </a:r>
+            <a:r>
+              <a:rPr lang="en-SE" dirty="0" err="1"/>
+              <a:t>för</a:t>
+            </a:r>
+            <a:r>
+              <a:rPr lang="en-SE" dirty="0"/>
+              <a:t> </a:t>
+            </a:r>
+            <a:r>
+              <a:rPr lang="en-SE" dirty="0" err="1"/>
+              <a:t>att</a:t>
+            </a:r>
+            <a:r>
+              <a:rPr lang="en-SE" dirty="0"/>
+              <a:t> </a:t>
+            </a:r>
+            <a:r>
+              <a:rPr lang="en-SE" dirty="0" err="1"/>
+              <a:t>skriva</a:t>
+            </a:r>
+            <a:r>
+              <a:rPr lang="en-SE" dirty="0"/>
+              <a:t> </a:t>
+            </a:r>
+            <a:r>
+              <a:rPr lang="en-SE" dirty="0" err="1"/>
+              <a:t>ut</a:t>
+            </a:r>
+            <a:r>
+              <a:rPr lang="en-SE" dirty="0"/>
+              <a:t> </a:t>
+            </a:r>
+            <a:r>
+              <a:rPr lang="en-SE" dirty="0" err="1"/>
+              <a:t>rätt</a:t>
+            </a:r>
+            <a:r>
+              <a:rPr lang="en-SE"/>
+              <a:t> text.</a:t>
+            </a:r>
+            <a:endParaRPr lang="en-SE" dirty="0"/>
+          </a:p>
+          <a:p>
+            <a:pPr>
+              <a:buFont typeface="Wingdings" panose="05000000000000000000" pitchFamily="2" charset="2"/>
+              <a:buChar char="§"/>
+            </a:pPr>
+            <a:endParaRPr lang="en-SE" dirty="0"/>
+          </a:p>
+        </p:txBody>
+      </p:sp>
+    </p:spTree>
+    <p:extLst>
+      <p:ext uri="{BB962C8B-B14F-4D97-AF65-F5344CB8AC3E}">
+        <p14:creationId xmlns:p14="http://schemas.microsoft.com/office/powerpoint/2010/main" val="3700496891"/>
       </p:ext>
     </p:extLst>
   </p:cSld>

</xml_diff>